<commit_message>
JinHyeong 기획서 ppt , word
</commit_message>
<xml_diff>
--- a/final_project/프로젝트 필요 양식/1조_기획서_발표.pptx
+++ b/final_project/프로젝트 필요 양식/1조_기획서_발표.pptx
@@ -7842,12 +7842,12 @@
         <p:spPr>
           <a:xfrm>
             <a:off x="464343" y="1876425"/>
-            <a:ext cx="9767887" cy="4525963"/>
+            <a:ext cx="10065544" cy="4525963"/>
           </a:xfrm>
         </p:spPr>
         <p:txBody>
           <a:bodyPr>
-            <a:normAutofit lnSpcReduction="10000"/>
+            <a:normAutofit/>
           </a:bodyPr>
           <a:lstStyle/>
           <a:p>
@@ -7855,19 +7855,19 @@
               <a:buAutoNum type="arabicPeriod"/>
             </a:pPr>
             <a:r>
-              <a:rPr lang="ko-KR" altLang="en-US" sz="2800" dirty="0"/>
+              <a:rPr lang="ko-KR" altLang="en-US" sz="2400" dirty="0"/>
               <a:t>상품 리뷰 데이터 수집</a:t>
             </a:r>
             <a:r>
-              <a:rPr lang="en-US" altLang="ko-KR" sz="2800" dirty="0"/>
+              <a:rPr lang="en-US" altLang="ko-KR" sz="2400" dirty="0"/>
               <a:t>(</a:t>
             </a:r>
             <a:r>
-              <a:rPr lang="ko-KR" altLang="en-US" sz="2800" dirty="0"/>
+              <a:rPr lang="ko-KR" altLang="en-US" sz="2400" dirty="0"/>
               <a:t>키워드 모델 구성을 위한 데이터</a:t>
             </a:r>
             <a:r>
-              <a:rPr lang="en-US" altLang="ko-KR" sz="2800" dirty="0"/>
+              <a:rPr lang="en-US" altLang="ko-KR" sz="2400" dirty="0"/>
               <a:t>set)</a:t>
             </a:r>
           </a:p>
@@ -7876,127 +7876,46 @@
               <a:buAutoNum type="arabicPeriod"/>
             </a:pPr>
             <a:r>
-              <a:rPr lang="ko-KR" altLang="en-US" sz="2800" dirty="0"/>
-              <a:t>수집된 데이터로 키워드 분류 모델 생성</a:t>
-            </a:r>
-            <a:endParaRPr lang="en-US" altLang="ko-KR" sz="2800" dirty="0"/>
+              <a:rPr lang="ko-KR" altLang="en-US" sz="2400"/>
+              <a:t>수집된 데이터의 </a:t>
+            </a:r>
+            <a:r>
+              <a:rPr lang="ko-KR" altLang="en-US" sz="2400" dirty="0"/>
+              <a:t>긍정</a:t>
+            </a:r>
+            <a:r>
+              <a:rPr lang="en-US" altLang="ko-KR" sz="2400" dirty="0"/>
+              <a:t>/</a:t>
+            </a:r>
+            <a:r>
+              <a:rPr lang="ko-KR" altLang="en-US" sz="2400" dirty="0"/>
+              <a:t>부정 </a:t>
+            </a:r>
+            <a:r>
+              <a:rPr lang="ko-KR" altLang="en-US" sz="2400" dirty="0" err="1"/>
+              <a:t>라벨링</a:t>
+            </a:r>
+            <a:r>
+              <a:rPr lang="ko-KR" altLang="en-US" sz="2400" dirty="0"/>
+              <a:t> 후 해당 데이터로 모델 생성</a:t>
+            </a:r>
+            <a:endParaRPr lang="en-US" altLang="ko-KR" sz="2400" dirty="0"/>
           </a:p>
           <a:p>
             <a:pPr marL="514350" indent="-514350">
-              <a:buFont typeface="Arial" pitchFamily="34" charset="0"/>
               <a:buAutoNum type="arabicPeriod"/>
             </a:pPr>
             <a:r>
-              <a:rPr lang="en-US" altLang="ko-KR" sz="2800" kern="0" spc="-100" dirty="0" err="1">
+              <a:rPr lang="ko-KR" altLang="en-US" sz="2400" kern="0" spc="-100" dirty="0">
                 <a:solidFill>
                   <a:srgbClr val="000000"/>
                 </a:solidFill>
                 <a:latin typeface="S-Core Dream 3 Light" pitchFamily="34" charset="0"/>
                 <a:cs typeface="S-Core Dream 3 Light" pitchFamily="34" charset="0"/>
               </a:rPr>
-              <a:t>특정</a:t>
-            </a:r>
-            <a:r>
-              <a:rPr lang="en-US" altLang="ko-KR" sz="2800" kern="0" spc="-100" dirty="0">
-                <a:solidFill>
-                  <a:srgbClr val="000000"/>
-                </a:solidFill>
-                <a:latin typeface="S-Core Dream 3 Light" pitchFamily="34" charset="0"/>
-                <a:cs typeface="S-Core Dream 3 Light" pitchFamily="34" charset="0"/>
-              </a:rPr>
-              <a:t> </a:t>
-            </a:r>
-            <a:r>
-              <a:rPr lang="en-US" altLang="ko-KR" sz="2800" kern="0" spc="-100" dirty="0" err="1">
-                <a:solidFill>
-                  <a:srgbClr val="000000"/>
-                </a:solidFill>
-                <a:latin typeface="S-Core Dream 3 Light" pitchFamily="34" charset="0"/>
-                <a:cs typeface="S-Core Dream 3 Light" pitchFamily="34" charset="0"/>
-              </a:rPr>
-              <a:t>사이트</a:t>
-            </a:r>
-            <a:r>
-              <a:rPr lang="en-US" altLang="ko-KR" sz="2800" kern="0" spc="-100" dirty="0">
-                <a:solidFill>
-                  <a:srgbClr val="000000"/>
-                </a:solidFill>
-                <a:latin typeface="S-Core Dream 3 Light" pitchFamily="34" charset="0"/>
-                <a:cs typeface="S-Core Dream 3 Light" pitchFamily="34" charset="0"/>
-              </a:rPr>
-              <a:t> </a:t>
-            </a:r>
-            <a:r>
-              <a:rPr lang="en-US" altLang="ko-KR" sz="2800" kern="0" spc="-100" dirty="0" err="1">
-                <a:solidFill>
-                  <a:srgbClr val="000000"/>
-                </a:solidFill>
-                <a:latin typeface="S-Core Dream 3 Light" pitchFamily="34" charset="0"/>
-                <a:cs typeface="S-Core Dream 3 Light" pitchFamily="34" charset="0"/>
-              </a:rPr>
-              <a:t>크롤링</a:t>
-            </a:r>
-            <a:r>
-              <a:rPr lang="en-US" altLang="ko-KR" sz="2800" kern="0" spc="-100" dirty="0">
-                <a:solidFill>
-                  <a:srgbClr val="000000"/>
-                </a:solidFill>
-                <a:latin typeface="S-Core Dream 3 Light" pitchFamily="34" charset="0"/>
-                <a:cs typeface="S-Core Dream 3 Light" pitchFamily="34" charset="0"/>
-              </a:rPr>
-              <a:t> </a:t>
-            </a:r>
-            <a:r>
-              <a:rPr lang="en-US" altLang="ko-KR" sz="2800" kern="0" spc="-100" dirty="0" err="1">
-                <a:solidFill>
-                  <a:srgbClr val="000000"/>
-                </a:solidFill>
-                <a:latin typeface="S-Core Dream 3 Light" pitchFamily="34" charset="0"/>
-                <a:cs typeface="S-Core Dream 3 Light" pitchFamily="34" charset="0"/>
-              </a:rPr>
-              <a:t>통한</a:t>
-            </a:r>
-            <a:r>
-              <a:rPr lang="en-US" altLang="ko-KR" sz="2800" kern="0" spc="-100" dirty="0">
-                <a:solidFill>
-                  <a:srgbClr val="000000"/>
-                </a:solidFill>
-                <a:latin typeface="S-Core Dream 3 Light" pitchFamily="34" charset="0"/>
-                <a:cs typeface="S-Core Dream 3 Light" pitchFamily="34" charset="0"/>
-              </a:rPr>
-              <a:t> input </a:t>
-            </a:r>
-            <a:r>
-              <a:rPr lang="en-US" altLang="ko-KR" sz="2800" kern="0" spc="-100" dirty="0" err="1">
-                <a:solidFill>
-                  <a:srgbClr val="000000"/>
-                </a:solidFill>
-                <a:latin typeface="S-Core Dream 3 Light" pitchFamily="34" charset="0"/>
-                <a:cs typeface="S-Core Dream 3 Light" pitchFamily="34" charset="0"/>
-              </a:rPr>
-              <a:t>데이터</a:t>
-            </a:r>
-            <a:r>
-              <a:rPr lang="en-US" altLang="ko-KR" sz="2800" kern="0" spc="-100" dirty="0">
-                <a:solidFill>
-                  <a:srgbClr val="000000"/>
-                </a:solidFill>
-                <a:latin typeface="S-Core Dream 3 Light" pitchFamily="34" charset="0"/>
-                <a:cs typeface="S-Core Dream 3 Light" pitchFamily="34" charset="0"/>
-              </a:rPr>
-              <a:t> </a:t>
-            </a:r>
-            <a:r>
-              <a:rPr lang="en-US" altLang="ko-KR" sz="2800" kern="0" spc="-100" dirty="0" err="1">
-                <a:solidFill>
-                  <a:srgbClr val="000000"/>
-                </a:solidFill>
-                <a:latin typeface="S-Core Dream 3 Light" pitchFamily="34" charset="0"/>
-                <a:cs typeface="S-Core Dream 3 Light" pitchFamily="34" charset="0"/>
-              </a:rPr>
-              <a:t>수집</a:t>
-            </a:r>
-            <a:endParaRPr lang="en-US" altLang="ko-KR" sz="2800" kern="0" spc="-100" dirty="0">
+              <a:t>모델을 통해 분류된 데이터로 리뷰 요약 모델 생성</a:t>
+            </a:r>
+            <a:endParaRPr lang="en-US" altLang="ko-KR" sz="2400" kern="0" spc="-100" dirty="0">
               <a:solidFill>
                 <a:srgbClr val="000000"/>
               </a:solidFill>
@@ -8006,100 +7925,49 @@
           </a:p>
           <a:p>
             <a:pPr marL="514350" indent="-514350">
-              <a:buFont typeface="Arial" pitchFamily="34" charset="0"/>
               <a:buAutoNum type="arabicPeriod"/>
             </a:pPr>
             <a:r>
-              <a:rPr lang="en-US" altLang="ko-KR" sz="2800" kern="0" spc="-100" dirty="0" err="1">
+              <a:rPr lang="ko-KR" altLang="en-US" sz="2400" kern="0" spc="-100" dirty="0" err="1">
                 <a:solidFill>
                   <a:srgbClr val="000000"/>
                 </a:solidFill>
                 <a:latin typeface="S-Core Dream 3 Light" pitchFamily="34" charset="0"/>
                 <a:cs typeface="S-Core Dream 3 Light" pitchFamily="34" charset="0"/>
               </a:rPr>
-              <a:t>수집된</a:t>
-            </a:r>
-            <a:r>
-              <a:rPr lang="en-US" altLang="ko-KR" sz="2800" kern="0" spc="-100" dirty="0">
+              <a:t>크롤링을</a:t>
+            </a:r>
+            <a:r>
+              <a:rPr lang="ko-KR" altLang="en-US" sz="2400" kern="0" spc="-100" dirty="0">
                 <a:solidFill>
                   <a:srgbClr val="000000"/>
                 </a:solidFill>
                 <a:latin typeface="S-Core Dream 3 Light" pitchFamily="34" charset="0"/>
                 <a:cs typeface="S-Core Dream 3 Light" pitchFamily="34" charset="0"/>
               </a:rPr>
-              <a:t> </a:t>
-            </a:r>
-            <a:r>
-              <a:rPr lang="en-US" altLang="ko-KR" sz="2800" kern="0" spc="-100" dirty="0" err="1">
+              <a:t> 통해 </a:t>
+            </a:r>
+            <a:r>
+              <a:rPr lang="en-US" altLang="ko-KR" sz="2400" kern="0" spc="-100" dirty="0">
                 <a:solidFill>
                   <a:srgbClr val="000000"/>
                 </a:solidFill>
                 <a:latin typeface="S-Core Dream 3 Light" pitchFamily="34" charset="0"/>
                 <a:cs typeface="S-Core Dream 3 Light" pitchFamily="34" charset="0"/>
               </a:rPr>
-              <a:t>데이터를</a:t>
-            </a:r>
-            <a:r>
-              <a:rPr lang="en-US" altLang="ko-KR" sz="2800" kern="0" spc="-100" dirty="0">
+              <a:t>input </a:t>
+            </a:r>
+            <a:r>
+              <a:rPr lang="ko-KR" altLang="en-US" sz="2400" kern="0" spc="-100" dirty="0">
                 <a:solidFill>
                   <a:srgbClr val="000000"/>
                 </a:solidFill>
                 <a:latin typeface="S-Core Dream 3 Light" pitchFamily="34" charset="0"/>
                 <a:cs typeface="S-Core Dream 3 Light" pitchFamily="34" charset="0"/>
               </a:rPr>
-              <a:t> </a:t>
-            </a:r>
-            <a:r>
-              <a:rPr lang="en-US" altLang="ko-KR" sz="2800" kern="0" spc="-100" dirty="0" err="1">
-                <a:solidFill>
-                  <a:srgbClr val="000000"/>
-                </a:solidFill>
-                <a:latin typeface="S-Core Dream 3 Light" pitchFamily="34" charset="0"/>
-                <a:cs typeface="S-Core Dream 3 Light" pitchFamily="34" charset="0"/>
-              </a:rPr>
-              <a:t>완성된</a:t>
-            </a:r>
-            <a:r>
-              <a:rPr lang="en-US" altLang="ko-KR" sz="2800" kern="0" spc="-100" dirty="0">
-                <a:solidFill>
-                  <a:srgbClr val="000000"/>
-                </a:solidFill>
-                <a:latin typeface="S-Core Dream 3 Light" pitchFamily="34" charset="0"/>
-                <a:cs typeface="S-Core Dream 3 Light" pitchFamily="34" charset="0"/>
-              </a:rPr>
-              <a:t> </a:t>
-            </a:r>
-            <a:r>
-              <a:rPr lang="en-US" altLang="ko-KR" sz="2800" kern="0" spc="-100" dirty="0" err="1">
-                <a:solidFill>
-                  <a:srgbClr val="000000"/>
-                </a:solidFill>
-                <a:latin typeface="S-Core Dream 3 Light" pitchFamily="34" charset="0"/>
-                <a:cs typeface="S-Core Dream 3 Light" pitchFamily="34" charset="0"/>
-              </a:rPr>
-              <a:t>모델에</a:t>
-            </a:r>
-            <a:r>
-              <a:rPr lang="en-US" altLang="ko-KR" sz="2800" kern="0" spc="-100" dirty="0">
-                <a:solidFill>
-                  <a:srgbClr val="000000"/>
-                </a:solidFill>
-                <a:latin typeface="S-Core Dream 3 Light" pitchFamily="34" charset="0"/>
-                <a:cs typeface="S-Core Dream 3 Light" pitchFamily="34" charset="0"/>
-              </a:rPr>
-              <a:t> </a:t>
-            </a:r>
-            <a:r>
-              <a:rPr lang="en-US" altLang="ko-KR" sz="2800" kern="0" spc="-100" dirty="0" err="1">
-                <a:solidFill>
-                  <a:srgbClr val="000000"/>
-                </a:solidFill>
-                <a:latin typeface="S-Core Dream 3 Light" pitchFamily="34" charset="0"/>
-                <a:cs typeface="S-Core Dream 3 Light" pitchFamily="34" charset="0"/>
-              </a:rPr>
-              <a:t>기입</a:t>
-            </a:r>
-            <a:endParaRPr lang="en-US" altLang="ko-KR" sz="2800" kern="0" spc="-100" dirty="0">
+              <a:t>데이터를 수집하는 프로그램 구현</a:t>
+            </a:r>
+            <a:endParaRPr lang="en-US" altLang="ko-KR" sz="2400" kern="0" spc="-100" dirty="0">
               <a:solidFill>
                 <a:srgbClr val="000000"/>
               </a:solidFill>
@@ -8113,17 +7981,17 @@
               <a:buAutoNum type="arabicPeriod"/>
             </a:pPr>
             <a:r>
-              <a:rPr lang="en-US" altLang="ko-KR" sz="2800" kern="0" spc="-100" dirty="0" err="1">
+              <a:rPr lang="en-US" altLang="ko-KR" sz="2400" kern="0" spc="-100" dirty="0" err="1">
                 <a:solidFill>
                   <a:srgbClr val="000000"/>
                 </a:solidFill>
                 <a:latin typeface="S-Core Dream 3 Light" pitchFamily="34" charset="0"/>
                 <a:cs typeface="S-Core Dream 3 Light" pitchFamily="34" charset="0"/>
               </a:rPr>
-              <a:t>모델을</a:t>
-            </a:r>
-            <a:r>
-              <a:rPr lang="en-US" altLang="ko-KR" sz="2800" kern="0" spc="-100" dirty="0">
+              <a:t>홈페이지</a:t>
+            </a:r>
+            <a:r>
+              <a:rPr lang="en-US" altLang="ko-KR" sz="2400" kern="0" spc="-100" dirty="0">
                 <a:solidFill>
                   <a:srgbClr val="000000"/>
                 </a:solidFill>
@@ -8133,7 +8001,27 @@
               <a:t> </a:t>
             </a:r>
             <a:r>
-              <a:rPr lang="en-US" altLang="ko-KR" sz="2800" kern="0" spc="-100" dirty="0" err="1">
+              <a:rPr lang="en-US" altLang="ko-KR" sz="2400" kern="0" spc="-100" dirty="0" err="1">
+                <a:solidFill>
+                  <a:srgbClr val="000000"/>
+                </a:solidFill>
+                <a:latin typeface="S-Core Dream 3 Light" pitchFamily="34" charset="0"/>
+                <a:cs typeface="S-Core Dream 3 Light" pitchFamily="34" charset="0"/>
+              </a:rPr>
+              <a:t>시각화를</a:t>
+            </a:r>
+            <a:r>
+              <a:rPr lang="en-US" altLang="ko-KR" sz="2400" kern="0" spc="-100" dirty="0">
+                <a:solidFill>
+                  <a:srgbClr val="000000"/>
+                </a:solidFill>
+                <a:latin typeface="S-Core Dream 3 Light" pitchFamily="34" charset="0"/>
+                <a:cs typeface="S-Core Dream 3 Light" pitchFamily="34" charset="0"/>
+              </a:rPr>
+              <a:t> </a:t>
+            </a:r>
+            <a:r>
+              <a:rPr lang="en-US" altLang="ko-KR" sz="2400" kern="0" spc="-100" dirty="0" err="1">
                 <a:solidFill>
                   <a:srgbClr val="000000"/>
                 </a:solidFill>
@@ -8143,7 +8031,7 @@
               <a:t>통해</a:t>
             </a:r>
             <a:r>
-              <a:rPr lang="en-US" altLang="ko-KR" sz="2800" kern="0" spc="-100" dirty="0">
+              <a:rPr lang="en-US" altLang="ko-KR" sz="2400" kern="0" spc="-100" dirty="0">
                 <a:solidFill>
                   <a:srgbClr val="000000"/>
                 </a:solidFill>
@@ -8153,17 +8041,17 @@
               <a:t> </a:t>
             </a:r>
             <a:r>
-              <a:rPr lang="en-US" altLang="ko-KR" sz="2800" kern="0" spc="-100" dirty="0" err="1">
+              <a:rPr lang="en-US" altLang="ko-KR" sz="2400" kern="0" spc="-100" dirty="0" err="1">
                 <a:solidFill>
                   <a:srgbClr val="000000"/>
                 </a:solidFill>
                 <a:latin typeface="S-Core Dream 3 Light" pitchFamily="34" charset="0"/>
                 <a:cs typeface="S-Core Dream 3 Light" pitchFamily="34" charset="0"/>
               </a:rPr>
-              <a:t>수집된</a:t>
-            </a:r>
-            <a:r>
-              <a:rPr lang="en-US" altLang="ko-KR" sz="2800" kern="0" spc="-100" dirty="0">
+              <a:t>서비스</a:t>
+            </a:r>
+            <a:r>
+              <a:rPr lang="en-US" altLang="ko-KR" sz="2400" kern="0" spc="-100" dirty="0">
                 <a:solidFill>
                   <a:srgbClr val="000000"/>
                 </a:solidFill>
@@ -8173,116 +8061,16 @@
               <a:t> </a:t>
             </a:r>
             <a:r>
-              <a:rPr lang="en-US" altLang="ko-KR" sz="2800" kern="0" spc="-100" dirty="0" err="1">
+              <a:rPr lang="en-US" altLang="ko-KR" sz="2400" kern="0" spc="-100" dirty="0" err="1">
                 <a:solidFill>
                   <a:srgbClr val="000000"/>
                 </a:solidFill>
                 <a:latin typeface="S-Core Dream 3 Light" pitchFamily="34" charset="0"/>
                 <a:cs typeface="S-Core Dream 3 Light" pitchFamily="34" charset="0"/>
               </a:rPr>
-              <a:t>키워드로</a:t>
-            </a:r>
-            <a:r>
-              <a:rPr lang="en-US" altLang="ko-KR" sz="2800" kern="0" spc="-100" dirty="0">
-                <a:solidFill>
-                  <a:srgbClr val="000000"/>
-                </a:solidFill>
-                <a:latin typeface="S-Core Dream 3 Light" pitchFamily="34" charset="0"/>
-                <a:cs typeface="S-Core Dream 3 Light" pitchFamily="34" charset="0"/>
-              </a:rPr>
-              <a:t> </a:t>
-            </a:r>
-            <a:r>
-              <a:rPr lang="en-US" altLang="ko-KR" sz="2800" kern="0" spc="-100" dirty="0" err="1">
-                <a:solidFill>
-                  <a:srgbClr val="000000"/>
-                </a:solidFill>
-                <a:latin typeface="S-Core Dream 3 Light" pitchFamily="34" charset="0"/>
-                <a:cs typeface="S-Core Dream 3 Light" pitchFamily="34" charset="0"/>
-              </a:rPr>
-              <a:t>리뷰</a:t>
-            </a:r>
-            <a:r>
-              <a:rPr lang="en-US" altLang="ko-KR" sz="2800" kern="0" spc="-100" dirty="0">
-                <a:solidFill>
-                  <a:srgbClr val="000000"/>
-                </a:solidFill>
-                <a:latin typeface="S-Core Dream 3 Light" pitchFamily="34" charset="0"/>
-                <a:cs typeface="S-Core Dream 3 Light" pitchFamily="34" charset="0"/>
-              </a:rPr>
-              <a:t> </a:t>
-            </a:r>
-            <a:r>
-              <a:rPr lang="en-US" altLang="ko-KR" sz="2800" kern="0" spc="-100" dirty="0" err="1">
-                <a:solidFill>
-                  <a:srgbClr val="000000"/>
-                </a:solidFill>
-                <a:latin typeface="S-Core Dream 3 Light" pitchFamily="34" charset="0"/>
-                <a:cs typeface="S-Core Dream 3 Light" pitchFamily="34" charset="0"/>
-              </a:rPr>
-              <a:t>요약</a:t>
-            </a:r>
-            <a:r>
-              <a:rPr lang="en-US" altLang="ko-KR" sz="2800" kern="0" spc="-100" dirty="0">
-                <a:solidFill>
-                  <a:srgbClr val="000000"/>
-                </a:solidFill>
-                <a:latin typeface="S-Core Dream 3 Light" pitchFamily="34" charset="0"/>
-                <a:cs typeface="S-Core Dream 3 Light" pitchFamily="34" charset="0"/>
-              </a:rPr>
-              <a:t> 및 </a:t>
-            </a:r>
-            <a:r>
-              <a:rPr lang="en-US" altLang="ko-KR" sz="2800" kern="0" spc="-100" dirty="0" err="1">
-                <a:solidFill>
-                  <a:srgbClr val="000000"/>
-                </a:solidFill>
-                <a:latin typeface="S-Core Dream 3 Light" pitchFamily="34" charset="0"/>
-                <a:cs typeface="S-Core Dream 3 Light" pitchFamily="34" charset="0"/>
-              </a:rPr>
-              <a:t>리뷰</a:t>
-            </a:r>
-            <a:r>
-              <a:rPr lang="en-US" altLang="ko-KR" sz="2800" kern="0" spc="-100" dirty="0">
-                <a:solidFill>
-                  <a:srgbClr val="000000"/>
-                </a:solidFill>
-                <a:latin typeface="S-Core Dream 3 Light" pitchFamily="34" charset="0"/>
-                <a:cs typeface="S-Core Dream 3 Light" pitchFamily="34" charset="0"/>
-              </a:rPr>
-              <a:t> </a:t>
-            </a:r>
-            <a:r>
-              <a:rPr lang="en-US" altLang="ko-KR" sz="2800" kern="0" spc="-100" dirty="0" err="1">
-                <a:solidFill>
-                  <a:srgbClr val="000000"/>
-                </a:solidFill>
-                <a:latin typeface="S-Core Dream 3 Light" pitchFamily="34" charset="0"/>
-                <a:cs typeface="S-Core Dream 3 Light" pitchFamily="34" charset="0"/>
-              </a:rPr>
-              <a:t>감정</a:t>
-            </a:r>
-            <a:r>
-              <a:rPr lang="en-US" altLang="ko-KR" sz="2800" kern="0" spc="-100" dirty="0">
-                <a:solidFill>
-                  <a:srgbClr val="000000"/>
-                </a:solidFill>
-                <a:latin typeface="S-Core Dream 3 Light" pitchFamily="34" charset="0"/>
-                <a:cs typeface="S-Core Dream 3 Light" pitchFamily="34" charset="0"/>
-              </a:rPr>
-              <a:t> </a:t>
-            </a:r>
-            <a:r>
-              <a:rPr lang="en-US" altLang="ko-KR" sz="2800" kern="0" spc="-100" dirty="0" err="1">
-                <a:solidFill>
-                  <a:srgbClr val="000000"/>
-                </a:solidFill>
-                <a:latin typeface="S-Core Dream 3 Light" pitchFamily="34" charset="0"/>
-                <a:cs typeface="S-Core Dream 3 Light" pitchFamily="34" charset="0"/>
-              </a:rPr>
-              <a:t>분석</a:t>
-            </a:r>
-            <a:endParaRPr lang="en-US" altLang="ko-KR" sz="2800" kern="0" spc="-100" dirty="0">
+              <a:t>제공</a:t>
+            </a:r>
+            <a:endParaRPr lang="en-US" altLang="ko-KR" sz="2400" kern="0" spc="-100" dirty="0">
               <a:solidFill>
                 <a:srgbClr val="000000"/>
               </a:solidFill>
@@ -8296,16 +8084,56 @@
               <a:buAutoNum type="arabicPeriod"/>
             </a:pPr>
             <a:r>
-              <a:rPr lang="ko-KR" altLang="en-US" sz="2800" kern="0" spc="-100" dirty="0">
+              <a:rPr lang="en-US" altLang="ko-KR" sz="2400" kern="0" spc="-100" dirty="0" err="1">
                 <a:solidFill>
                   <a:srgbClr val="000000"/>
                 </a:solidFill>
                 <a:latin typeface="S-Core Dream 3 Light" pitchFamily="34" charset="0"/>
                 <a:cs typeface="S-Core Dream 3 Light" pitchFamily="34" charset="0"/>
               </a:rPr>
-              <a:t>평점 예측 기능 구현</a:t>
-            </a:r>
-            <a:endParaRPr lang="en-US" altLang="ko-KR" sz="2800" kern="0" spc="-100" dirty="0">
+              <a:t>로그인</a:t>
+            </a:r>
+            <a:r>
+              <a:rPr lang="en-US" altLang="ko-KR" sz="2400" kern="0" spc="-100" dirty="0">
+                <a:solidFill>
+                  <a:srgbClr val="000000"/>
+                </a:solidFill>
+                <a:latin typeface="S-Core Dream 3 Light" pitchFamily="34" charset="0"/>
+                <a:cs typeface="S-Core Dream 3 Light" pitchFamily="34" charset="0"/>
+              </a:rPr>
+              <a:t> </a:t>
+            </a:r>
+            <a:r>
+              <a:rPr lang="en-US" altLang="ko-KR" sz="2400" kern="0" spc="-100" dirty="0" err="1">
+                <a:solidFill>
+                  <a:srgbClr val="000000"/>
+                </a:solidFill>
+                <a:latin typeface="S-Core Dream 3 Light" pitchFamily="34" charset="0"/>
+                <a:cs typeface="S-Core Dream 3 Light" pitchFamily="34" charset="0"/>
+              </a:rPr>
+              <a:t>기능</a:t>
+            </a:r>
+            <a:r>
+              <a:rPr lang="en-US" altLang="ko-KR" sz="2400" kern="0" spc="-100" dirty="0">
+                <a:solidFill>
+                  <a:srgbClr val="000000"/>
+                </a:solidFill>
+                <a:latin typeface="S-Core Dream 3 Light" pitchFamily="34" charset="0"/>
+                <a:cs typeface="S-Core Dream 3 Light" pitchFamily="34" charset="0"/>
+              </a:rPr>
+              <a:t> </a:t>
+            </a:r>
+            <a:r>
+              <a:rPr lang="ko-KR" altLang="en-US" sz="2400" kern="0" spc="-100" dirty="0">
+                <a:solidFill>
+                  <a:srgbClr val="000000"/>
+                </a:solidFill>
+                <a:latin typeface="S-Core Dream 3 Light" pitchFamily="34" charset="0"/>
+                <a:cs typeface="S-Core Dream 3 Light" pitchFamily="34" charset="0"/>
+              </a:rPr>
+              <a:t>설계</a:t>
+            </a:r>
+            <a:endParaRPr lang="en-US" altLang="ko-KR" sz="2400" kern="0" spc="-100" dirty="0">
               <a:solidFill>
                 <a:srgbClr val="000000"/>
               </a:solidFill>
@@ -8319,96 +8147,16 @@
               <a:buAutoNum type="arabicPeriod"/>
             </a:pPr>
             <a:r>
-              <a:rPr lang="en-US" altLang="ko-KR" sz="2800" kern="0" spc="-100" dirty="0" err="1">
+              <a:rPr lang="ko-KR" altLang="en-US" sz="2400" kern="0" spc="-100" dirty="0">
                 <a:solidFill>
                   <a:srgbClr val="000000"/>
                 </a:solidFill>
                 <a:latin typeface="S-Core Dream 3 Light" pitchFamily="34" charset="0"/>
                 <a:cs typeface="S-Core Dream 3 Light" pitchFamily="34" charset="0"/>
               </a:rPr>
-              <a:t>홈페이지</a:t>
-            </a:r>
-            <a:r>
-              <a:rPr lang="en-US" altLang="ko-KR" sz="2800" kern="0" spc="-100" dirty="0">
-                <a:solidFill>
-                  <a:srgbClr val="000000"/>
-                </a:solidFill>
-                <a:latin typeface="S-Core Dream 3 Light" pitchFamily="34" charset="0"/>
-                <a:cs typeface="S-Core Dream 3 Light" pitchFamily="34" charset="0"/>
-              </a:rPr>
-              <a:t> </a:t>
-            </a:r>
-            <a:r>
-              <a:rPr lang="en-US" altLang="ko-KR" sz="2800" kern="0" spc="-100" dirty="0" err="1">
-                <a:solidFill>
-                  <a:srgbClr val="000000"/>
-                </a:solidFill>
-                <a:latin typeface="S-Core Dream 3 Light" pitchFamily="34" charset="0"/>
-                <a:cs typeface="S-Core Dream 3 Light" pitchFamily="34" charset="0"/>
-              </a:rPr>
-              <a:t>시각화를</a:t>
-            </a:r>
-            <a:r>
-              <a:rPr lang="en-US" altLang="ko-KR" sz="2800" kern="0" spc="-100" dirty="0">
-                <a:solidFill>
-                  <a:srgbClr val="000000"/>
-                </a:solidFill>
-                <a:latin typeface="S-Core Dream 3 Light" pitchFamily="34" charset="0"/>
-                <a:cs typeface="S-Core Dream 3 Light" pitchFamily="34" charset="0"/>
-              </a:rPr>
-              <a:t> </a:t>
-            </a:r>
-            <a:r>
-              <a:rPr lang="en-US" altLang="ko-KR" sz="2800" kern="0" spc="-100" dirty="0" err="1">
-                <a:solidFill>
-                  <a:srgbClr val="000000"/>
-                </a:solidFill>
-                <a:latin typeface="S-Core Dream 3 Light" pitchFamily="34" charset="0"/>
-                <a:cs typeface="S-Core Dream 3 Light" pitchFamily="34" charset="0"/>
-              </a:rPr>
-              <a:t>통해</a:t>
-            </a:r>
-            <a:r>
-              <a:rPr lang="en-US" altLang="ko-KR" sz="2800" kern="0" spc="-100" dirty="0">
-                <a:solidFill>
-                  <a:srgbClr val="000000"/>
-                </a:solidFill>
-                <a:latin typeface="S-Core Dream 3 Light" pitchFamily="34" charset="0"/>
-                <a:cs typeface="S-Core Dream 3 Light" pitchFamily="34" charset="0"/>
-              </a:rPr>
-              <a:t> </a:t>
-            </a:r>
-            <a:r>
-              <a:rPr lang="en-US" altLang="ko-KR" sz="2800" kern="0" spc="-100" dirty="0" err="1">
-                <a:solidFill>
-                  <a:srgbClr val="000000"/>
-                </a:solidFill>
-                <a:latin typeface="S-Core Dream 3 Light" pitchFamily="34" charset="0"/>
-                <a:cs typeface="S-Core Dream 3 Light" pitchFamily="34" charset="0"/>
-              </a:rPr>
-              <a:t>서비스</a:t>
-            </a:r>
-            <a:r>
-              <a:rPr lang="en-US" altLang="ko-KR" sz="2800" kern="0" spc="-100" dirty="0">
-                <a:solidFill>
-                  <a:srgbClr val="000000"/>
-                </a:solidFill>
-                <a:latin typeface="S-Core Dream 3 Light" pitchFamily="34" charset="0"/>
-                <a:cs typeface="S-Core Dream 3 Light" pitchFamily="34" charset="0"/>
-              </a:rPr>
-              <a:t> </a:t>
-            </a:r>
-            <a:r>
-              <a:rPr lang="en-US" altLang="ko-KR" sz="2800" kern="0" spc="-100" dirty="0" err="1">
-                <a:solidFill>
-                  <a:srgbClr val="000000"/>
-                </a:solidFill>
-                <a:latin typeface="S-Core Dream 3 Light" pitchFamily="34" charset="0"/>
-                <a:cs typeface="S-Core Dream 3 Light" pitchFamily="34" charset="0"/>
-              </a:rPr>
-              <a:t>제공</a:t>
-            </a:r>
-            <a:endParaRPr lang="en-US" altLang="ko-KR" sz="2800" kern="0" spc="-100" dirty="0">
+              <a:t>프로그램 시행 및 오류 피드백</a:t>
+            </a:r>
+            <a:endParaRPr lang="en-US" altLang="ko-KR" sz="2400" kern="0" spc="-100" dirty="0">
               <a:solidFill>
                 <a:srgbClr val="000000"/>
               </a:solidFill>
@@ -8418,101 +8166,15 @@
           </a:p>
           <a:p>
             <a:pPr marL="514350" indent="-514350">
-              <a:buFont typeface="Arial" pitchFamily="34" charset="0"/>
               <a:buAutoNum type="arabicPeriod"/>
             </a:pPr>
-            <a:r>
-              <a:rPr lang="en-US" altLang="ko-KR" sz="2800" kern="0" spc="-100" dirty="0" err="1">
-                <a:solidFill>
-                  <a:srgbClr val="000000"/>
-                </a:solidFill>
-                <a:latin typeface="S-Core Dream 3 Light" pitchFamily="34" charset="0"/>
-                <a:cs typeface="S-Core Dream 3 Light" pitchFamily="34" charset="0"/>
-              </a:rPr>
-              <a:t>로그인</a:t>
-            </a:r>
-            <a:r>
-              <a:rPr lang="en-US" altLang="ko-KR" sz="2800" kern="0" spc="-100" dirty="0">
-                <a:solidFill>
-                  <a:srgbClr val="000000"/>
-                </a:solidFill>
-                <a:latin typeface="S-Core Dream 3 Light" pitchFamily="34" charset="0"/>
-                <a:cs typeface="S-Core Dream 3 Light" pitchFamily="34" charset="0"/>
-              </a:rPr>
-              <a:t> </a:t>
-            </a:r>
-            <a:r>
-              <a:rPr lang="en-US" altLang="ko-KR" sz="2800" kern="0" spc="-100" dirty="0" err="1">
-                <a:solidFill>
-                  <a:srgbClr val="000000"/>
-                </a:solidFill>
-                <a:latin typeface="S-Core Dream 3 Light" pitchFamily="34" charset="0"/>
-                <a:cs typeface="S-Core Dream 3 Light" pitchFamily="34" charset="0"/>
-              </a:rPr>
-              <a:t>기능</a:t>
-            </a:r>
-            <a:r>
-              <a:rPr lang="en-US" altLang="ko-KR" sz="2800" kern="0" spc="-100" dirty="0">
-                <a:solidFill>
-                  <a:srgbClr val="000000"/>
-                </a:solidFill>
-                <a:latin typeface="S-Core Dream 3 Light" pitchFamily="34" charset="0"/>
-                <a:cs typeface="S-Core Dream 3 Light" pitchFamily="34" charset="0"/>
-              </a:rPr>
-              <a:t> </a:t>
-            </a:r>
-            <a:r>
-              <a:rPr lang="ko-KR" altLang="en-US" sz="2800" kern="0" spc="-100" dirty="0">
-                <a:solidFill>
-                  <a:srgbClr val="000000"/>
-                </a:solidFill>
-                <a:latin typeface="S-Core Dream 3 Light" pitchFamily="34" charset="0"/>
-                <a:cs typeface="S-Core Dream 3 Light" pitchFamily="34" charset="0"/>
-              </a:rPr>
-              <a:t>설계</a:t>
-            </a:r>
-            <a:endParaRPr lang="en-US" altLang="ko-KR" sz="2800" kern="0" spc="-100" dirty="0">
-              <a:solidFill>
-                <a:srgbClr val="000000"/>
-              </a:solidFill>
-              <a:latin typeface="S-Core Dream 3 Light" pitchFamily="34" charset="0"/>
-              <a:cs typeface="S-Core Dream 3 Light" pitchFamily="34" charset="0"/>
-            </a:endParaRPr>
-          </a:p>
-          <a:p>
-            <a:pPr marL="514350" indent="-514350">
-              <a:buFont typeface="Arial" pitchFamily="34" charset="0"/>
-              <a:buAutoNum type="arabicPeriod"/>
-            </a:pPr>
-            <a:r>
-              <a:rPr lang="ko-KR" altLang="en-US" sz="2800" kern="0" spc="-100" dirty="0">
-                <a:solidFill>
-                  <a:srgbClr val="000000"/>
-                </a:solidFill>
-                <a:latin typeface="S-Core Dream 3 Light" pitchFamily="34" charset="0"/>
-                <a:cs typeface="S-Core Dream 3 Light" pitchFamily="34" charset="0"/>
-              </a:rPr>
-              <a:t>프로그램 시행 및 오류 피드백</a:t>
-            </a:r>
-            <a:endParaRPr lang="en-US" altLang="ko-KR" sz="2800" kern="0" spc="-100" dirty="0">
-              <a:solidFill>
-                <a:srgbClr val="000000"/>
-              </a:solidFill>
-              <a:latin typeface="S-Core Dream 3 Light" pitchFamily="34" charset="0"/>
-              <a:cs typeface="S-Core Dream 3 Light" pitchFamily="34" charset="0"/>
-            </a:endParaRPr>
-          </a:p>
-          <a:p>
-            <a:pPr marL="514350" indent="-514350">
-              <a:buAutoNum type="arabicPeriod"/>
-            </a:pPr>
-            <a:endParaRPr lang="en-US" altLang="ko-KR" sz="2800" dirty="0"/>
+            <a:endParaRPr lang="en-US" altLang="ko-KR" sz="2400" dirty="0"/>
           </a:p>
           <a:p>
             <a:pPr marL="0" indent="0">
               <a:buNone/>
             </a:pPr>
-            <a:endParaRPr lang="ko-KR" altLang="en-US" sz="2800" dirty="0"/>
+            <a:endParaRPr lang="ko-KR" altLang="en-US" sz="2400" dirty="0"/>
           </a:p>
         </p:txBody>
       </p:sp>

</xml_diff>